<commit_message>
Added additional slides to conclusion
.
</commit_message>
<xml_diff>
--- a/Video Presentation V2.pptx
+++ b/Video Presentation V2.pptx
@@ -17,6 +17,11 @@
     <p:sldId id="266" r:id="rId11"/>
     <p:sldId id="267" r:id="rId12"/>
     <p:sldId id="268" r:id="rId13"/>
+    <p:sldId id="269" r:id="rId14"/>
+    <p:sldId id="270" r:id="rId15"/>
+    <p:sldId id="271" r:id="rId16"/>
+    <p:sldId id="272" r:id="rId17"/>
+    <p:sldId id="273" r:id="rId18"/>
   </p:sldIdLst>
   <p:sldSz cx="12192000" cy="6858000"/>
   <p:notesSz cx="6858000" cy="9144000"/>
@@ -3644,10 +3649,10 @@
       </p:sp>
       <p:sp>
         <p:nvSpPr>
-          <p:cNvPr id="3" name="Content Placeholder 2">
-            <a:extLst>
-              <a:ext uri="{FF2B5EF4-FFF2-40B4-BE49-F238E27FC236}">
-                <a16:creationId xmlns:a16="http://schemas.microsoft.com/office/drawing/2014/main" id="{015734A6-6474-4FBB-A0B7-14AB30A8FA53}"/>
+          <p:cNvPr id="5" name="Content Placeholder 4">
+            <a:extLst>
+              <a:ext uri="{FF2B5EF4-FFF2-40B4-BE49-F238E27FC236}">
+                <a16:creationId xmlns:a16="http://schemas.microsoft.com/office/drawing/2014/main" id="{02C2EBC2-71E7-431E-B83F-CFF0016591DF}"/>
               </a:ext>
             </a:extLst>
           </p:cNvPr>
@@ -3660,64 +3665,10 @@
         </p:nvSpPr>
         <p:spPr/>
         <p:txBody>
-          <a:bodyPr>
-            <a:normAutofit fontScale="92500" lnSpcReduction="20000"/>
-          </a:bodyPr>
-          <a:lstStyle/>
-          <a:p>
-            <a:r>
-              <a:rPr lang="en-GB" dirty="0"/>
-              <a:t>What we learnt</a:t>
-            </a:r>
-          </a:p>
+          <a:bodyPr/>
+          <a:lstStyle/>
           <a:p>
             <a:endParaRPr lang="en-GB" dirty="0"/>
-          </a:p>
-          <a:p>
-            <a:r>
-              <a:rPr lang="en-GB" dirty="0"/>
-              <a:t>Team dynamics</a:t>
-            </a:r>
-          </a:p>
-          <a:p>
-            <a:endParaRPr lang="en-GB" dirty="0"/>
-          </a:p>
-          <a:p>
-            <a:r>
-              <a:rPr lang="en-GB" dirty="0"/>
-              <a:t>What went well</a:t>
-            </a:r>
-          </a:p>
-          <a:p>
-            <a:endParaRPr lang="en-GB" dirty="0"/>
-          </a:p>
-          <a:p>
-            <a:r>
-              <a:rPr lang="en-GB" dirty="0"/>
-              <a:t>What could’ve </a:t>
-            </a:r>
-            <a:r>
-              <a:rPr lang="en-GB"/>
-              <a:t>been better </a:t>
-            </a:r>
-            <a:endParaRPr lang="en-GB" dirty="0"/>
-          </a:p>
-          <a:p>
-            <a:endParaRPr lang="en-GB" dirty="0"/>
-          </a:p>
-          <a:p>
-            <a:r>
-              <a:rPr lang="en-GB" dirty="0"/>
-              <a:t>How we fell about the game – works for </a:t>
-            </a:r>
-            <a:r>
-              <a:rPr lang="en-GB" dirty="0" err="1"/>
-              <a:t>tdemo</a:t>
-            </a:r>
-            <a:r>
-              <a:rPr lang="en-GB" dirty="0"/>
-              <a:t>, given more time + resources = better game. If second time better learnt due to working earlier</a:t>
-            </a:r>
           </a:p>
         </p:txBody>
       </p:sp>
@@ -3725,6 +3676,493 @@
     <p:extLst>
       <p:ext uri="{BB962C8B-B14F-4D97-AF65-F5344CB8AC3E}">
         <p14:creationId xmlns:p14="http://schemas.microsoft.com/office/powerpoint/2010/main" val="1709177854"/>
+      </p:ext>
+    </p:extLst>
+  </p:cSld>
+  <p:clrMapOvr>
+    <a:masterClrMapping/>
+  </p:clrMapOvr>
+</p:sld>
+</file>
+
+<file path=ppt/slides/slide13.xml><?xml version="1.0" encoding="utf-8"?>
+<p:sld xmlns:a="http://schemas.openxmlformats.org/drawingml/2006/main" xmlns:r="http://schemas.openxmlformats.org/officeDocument/2006/relationships" xmlns:p="http://schemas.openxmlformats.org/presentationml/2006/main">
+  <p:cSld>
+    <p:spTree>
+      <p:nvGrpSpPr>
+        <p:cNvPr id="1" name=""/>
+        <p:cNvGrpSpPr/>
+        <p:nvPr/>
+      </p:nvGrpSpPr>
+      <p:grpSpPr>
+        <a:xfrm>
+          <a:off x="0" y="0"/>
+          <a:ext cx="0" cy="0"/>
+          <a:chOff x="0" y="0"/>
+          <a:chExt cx="0" cy="0"/>
+        </a:xfrm>
+      </p:grpSpPr>
+      <p:sp>
+        <p:nvSpPr>
+          <p:cNvPr id="2" name="Title 1">
+            <a:extLst>
+              <a:ext uri="{FF2B5EF4-FFF2-40B4-BE49-F238E27FC236}">
+                <a16:creationId xmlns:a16="http://schemas.microsoft.com/office/drawing/2014/main" id="{B8FDBBEE-0677-49B0-80CC-DE07A94593B3}"/>
+              </a:ext>
+            </a:extLst>
+          </p:cNvPr>
+          <p:cNvSpPr>
+            <a:spLocks noGrp="1"/>
+          </p:cNvSpPr>
+          <p:nvPr>
+            <p:ph type="title"/>
+          </p:nvPr>
+        </p:nvSpPr>
+        <p:spPr/>
+        <p:txBody>
+          <a:bodyPr/>
+          <a:lstStyle/>
+          <a:p>
+            <a:r>
+              <a:rPr lang="en-GB" dirty="0"/>
+              <a:t>What we learnt</a:t>
+            </a:r>
+          </a:p>
+        </p:txBody>
+      </p:sp>
+      <p:sp>
+        <p:nvSpPr>
+          <p:cNvPr id="4" name="AutoShape 4" descr="Image result for clock handle">
+            <a:extLst>
+              <a:ext uri="{FF2B5EF4-FFF2-40B4-BE49-F238E27FC236}">
+                <a16:creationId xmlns:a16="http://schemas.microsoft.com/office/drawing/2014/main" id="{E582BF6C-CD4B-4218-BF3E-E4E26184B903}"/>
+              </a:ext>
+            </a:extLst>
+          </p:cNvPr>
+          <p:cNvSpPr>
+            <a:spLocks noChangeAspect="1" noChangeArrowheads="1"/>
+          </p:cNvSpPr>
+          <p:nvPr/>
+        </p:nvSpPr>
+        <p:spPr bwMode="auto">
+          <a:xfrm>
+            <a:off x="5943600" y="3276600"/>
+            <a:ext cx="304800" cy="304800"/>
+          </a:xfrm>
+          <a:prstGeom prst="rect">
+            <a:avLst/>
+          </a:prstGeom>
+          <a:noFill/>
+          <a:extLst>
+            <a:ext uri="{909E8E84-426E-40DD-AFC4-6F175D3DCCD1}">
+              <a14:hiddenFill xmlns:a14="http://schemas.microsoft.com/office/drawing/2010/main">
+                <a:solidFill>
+                  <a:srgbClr val="FFFFFF"/>
+                </a:solidFill>
+              </a14:hiddenFill>
+            </a:ext>
+          </a:extLst>
+        </p:spPr>
+        <p:txBody>
+          <a:bodyPr vert="horz" wrap="square" lIns="91440" tIns="45720" rIns="91440" bIns="45720" numCol="1" anchor="t" anchorCtr="0" compatLnSpc="1">
+            <a:prstTxWarp prst="textNoShape">
+              <a:avLst/>
+            </a:prstTxWarp>
+          </a:bodyPr>
+          <a:lstStyle/>
+          <a:p>
+            <a:endParaRPr lang="en-GB"/>
+          </a:p>
+        </p:txBody>
+      </p:sp>
+      <p:sp>
+        <p:nvSpPr>
+          <p:cNvPr id="10" name="TextBox 9">
+            <a:extLst>
+              <a:ext uri="{FF2B5EF4-FFF2-40B4-BE49-F238E27FC236}">
+                <a16:creationId xmlns:a16="http://schemas.microsoft.com/office/drawing/2014/main" id="{9039195D-D027-409D-9215-61D4B78D1247}"/>
+              </a:ext>
+            </a:extLst>
+          </p:cNvPr>
+          <p:cNvSpPr txBox="1"/>
+          <p:nvPr/>
+        </p:nvSpPr>
+        <p:spPr>
+          <a:xfrm>
+            <a:off x="838200" y="2083267"/>
+            <a:ext cx="10536572" cy="1477328"/>
+          </a:xfrm>
+          <a:prstGeom prst="rect">
+            <a:avLst/>
+          </a:prstGeom>
+          <a:noFill/>
+        </p:spPr>
+        <p:txBody>
+          <a:bodyPr wrap="square" rtlCol="0">
+            <a:spAutoFit/>
+          </a:bodyPr>
+          <a:lstStyle/>
+          <a:p>
+            <a:r>
+              <a:rPr lang="en-GB" dirty="0"/>
+              <a:t>Time management – graphic of a clock going around clockwise</a:t>
+            </a:r>
+          </a:p>
+          <a:p>
+            <a:endParaRPr lang="en-GB" dirty="0"/>
+          </a:p>
+          <a:p>
+            <a:endParaRPr lang="en-GB" dirty="0"/>
+          </a:p>
+          <a:p>
+            <a:endParaRPr lang="en-GB" dirty="0"/>
+          </a:p>
+          <a:p>
+            <a:endParaRPr lang="en-GB" dirty="0"/>
+          </a:p>
+        </p:txBody>
+      </p:sp>
+    </p:spTree>
+    <p:extLst>
+      <p:ext uri="{BB962C8B-B14F-4D97-AF65-F5344CB8AC3E}">
+        <p14:creationId xmlns:p14="http://schemas.microsoft.com/office/powerpoint/2010/main" val="2956389422"/>
+      </p:ext>
+    </p:extLst>
+  </p:cSld>
+  <p:clrMapOvr>
+    <a:masterClrMapping/>
+  </p:clrMapOvr>
+</p:sld>
+</file>
+
+<file path=ppt/slides/slide14.xml><?xml version="1.0" encoding="utf-8"?>
+<p:sld xmlns:a="http://schemas.openxmlformats.org/drawingml/2006/main" xmlns:r="http://schemas.openxmlformats.org/officeDocument/2006/relationships" xmlns:p="http://schemas.openxmlformats.org/presentationml/2006/main">
+  <p:cSld>
+    <p:spTree>
+      <p:nvGrpSpPr>
+        <p:cNvPr id="1" name=""/>
+        <p:cNvGrpSpPr/>
+        <p:nvPr/>
+      </p:nvGrpSpPr>
+      <p:grpSpPr>
+        <a:xfrm>
+          <a:off x="0" y="0"/>
+          <a:ext cx="0" cy="0"/>
+          <a:chOff x="0" y="0"/>
+          <a:chExt cx="0" cy="0"/>
+        </a:xfrm>
+      </p:grpSpPr>
+      <p:sp>
+        <p:nvSpPr>
+          <p:cNvPr id="2" name="Title 1">
+            <a:extLst>
+              <a:ext uri="{FF2B5EF4-FFF2-40B4-BE49-F238E27FC236}">
+                <a16:creationId xmlns:a16="http://schemas.microsoft.com/office/drawing/2014/main" id="{0600F74B-00EB-47F9-8675-54F6DBB83BF6}"/>
+              </a:ext>
+            </a:extLst>
+          </p:cNvPr>
+          <p:cNvSpPr>
+            <a:spLocks noGrp="1"/>
+          </p:cNvSpPr>
+          <p:nvPr>
+            <p:ph type="title"/>
+          </p:nvPr>
+        </p:nvSpPr>
+        <p:spPr/>
+        <p:txBody>
+          <a:bodyPr/>
+          <a:lstStyle/>
+          <a:p>
+            <a:r>
+              <a:rPr lang="en-GB" dirty="0"/>
+              <a:t>Team </a:t>
+            </a:r>
+            <a:r>
+              <a:rPr lang="en-GB" dirty="0" err="1"/>
+              <a:t>dyanmics</a:t>
+            </a:r>
+            <a:endParaRPr lang="en-GB" dirty="0"/>
+          </a:p>
+        </p:txBody>
+      </p:sp>
+      <p:sp>
+        <p:nvSpPr>
+          <p:cNvPr id="3" name="Content Placeholder 2">
+            <a:extLst>
+              <a:ext uri="{FF2B5EF4-FFF2-40B4-BE49-F238E27FC236}">
+                <a16:creationId xmlns:a16="http://schemas.microsoft.com/office/drawing/2014/main" id="{6833F175-47D4-408F-AA33-C199431C5E72}"/>
+              </a:ext>
+            </a:extLst>
+          </p:cNvPr>
+          <p:cNvSpPr>
+            <a:spLocks noGrp="1"/>
+          </p:cNvSpPr>
+          <p:nvPr>
+            <p:ph idx="1"/>
+          </p:nvPr>
+        </p:nvSpPr>
+        <p:spPr/>
+        <p:txBody>
+          <a:bodyPr/>
+          <a:lstStyle/>
+          <a:p>
+            <a:endParaRPr lang="en-GB"/>
+          </a:p>
+        </p:txBody>
+      </p:sp>
+    </p:spTree>
+    <p:extLst>
+      <p:ext uri="{BB962C8B-B14F-4D97-AF65-F5344CB8AC3E}">
+        <p14:creationId xmlns:p14="http://schemas.microsoft.com/office/powerpoint/2010/main" val="178313222"/>
+      </p:ext>
+    </p:extLst>
+  </p:cSld>
+  <p:clrMapOvr>
+    <a:masterClrMapping/>
+  </p:clrMapOvr>
+</p:sld>
+</file>
+
+<file path=ppt/slides/slide15.xml><?xml version="1.0" encoding="utf-8"?>
+<p:sld xmlns:a="http://schemas.openxmlformats.org/drawingml/2006/main" xmlns:r="http://schemas.openxmlformats.org/officeDocument/2006/relationships" xmlns:p="http://schemas.openxmlformats.org/presentationml/2006/main">
+  <p:cSld>
+    <p:spTree>
+      <p:nvGrpSpPr>
+        <p:cNvPr id="1" name=""/>
+        <p:cNvGrpSpPr/>
+        <p:nvPr/>
+      </p:nvGrpSpPr>
+      <p:grpSpPr>
+        <a:xfrm>
+          <a:off x="0" y="0"/>
+          <a:ext cx="0" cy="0"/>
+          <a:chOff x="0" y="0"/>
+          <a:chExt cx="0" cy="0"/>
+        </a:xfrm>
+      </p:grpSpPr>
+      <p:sp>
+        <p:nvSpPr>
+          <p:cNvPr id="2" name="Title 1">
+            <a:extLst>
+              <a:ext uri="{FF2B5EF4-FFF2-40B4-BE49-F238E27FC236}">
+                <a16:creationId xmlns:a16="http://schemas.microsoft.com/office/drawing/2014/main" id="{1E6E1E1A-ED69-458E-8CA9-CE642093C764}"/>
+              </a:ext>
+            </a:extLst>
+          </p:cNvPr>
+          <p:cNvSpPr>
+            <a:spLocks noGrp="1"/>
+          </p:cNvSpPr>
+          <p:nvPr>
+            <p:ph type="title"/>
+          </p:nvPr>
+        </p:nvSpPr>
+        <p:spPr/>
+        <p:txBody>
+          <a:bodyPr/>
+          <a:lstStyle/>
+          <a:p>
+            <a:r>
+              <a:rPr lang="en-GB" dirty="0"/>
+              <a:t>What went well </a:t>
+            </a:r>
+          </a:p>
+        </p:txBody>
+      </p:sp>
+      <p:sp>
+        <p:nvSpPr>
+          <p:cNvPr id="3" name="Content Placeholder 2">
+            <a:extLst>
+              <a:ext uri="{FF2B5EF4-FFF2-40B4-BE49-F238E27FC236}">
+                <a16:creationId xmlns:a16="http://schemas.microsoft.com/office/drawing/2014/main" id="{0151FEB4-D227-4AFC-8289-0F973A258ABF}"/>
+              </a:ext>
+            </a:extLst>
+          </p:cNvPr>
+          <p:cNvSpPr>
+            <a:spLocks noGrp="1"/>
+          </p:cNvSpPr>
+          <p:nvPr>
+            <p:ph idx="1"/>
+          </p:nvPr>
+        </p:nvSpPr>
+        <p:spPr/>
+        <p:txBody>
+          <a:bodyPr/>
+          <a:lstStyle/>
+          <a:p>
+            <a:endParaRPr lang="en-GB"/>
+          </a:p>
+        </p:txBody>
+      </p:sp>
+    </p:spTree>
+    <p:extLst>
+      <p:ext uri="{BB962C8B-B14F-4D97-AF65-F5344CB8AC3E}">
+        <p14:creationId xmlns:p14="http://schemas.microsoft.com/office/powerpoint/2010/main" val="2683828991"/>
+      </p:ext>
+    </p:extLst>
+  </p:cSld>
+  <p:clrMapOvr>
+    <a:masterClrMapping/>
+  </p:clrMapOvr>
+</p:sld>
+</file>
+
+<file path=ppt/slides/slide16.xml><?xml version="1.0" encoding="utf-8"?>
+<p:sld xmlns:a="http://schemas.openxmlformats.org/drawingml/2006/main" xmlns:r="http://schemas.openxmlformats.org/officeDocument/2006/relationships" xmlns:p="http://schemas.openxmlformats.org/presentationml/2006/main">
+  <p:cSld>
+    <p:spTree>
+      <p:nvGrpSpPr>
+        <p:cNvPr id="1" name=""/>
+        <p:cNvGrpSpPr/>
+        <p:nvPr/>
+      </p:nvGrpSpPr>
+      <p:grpSpPr>
+        <a:xfrm>
+          <a:off x="0" y="0"/>
+          <a:ext cx="0" cy="0"/>
+          <a:chOff x="0" y="0"/>
+          <a:chExt cx="0" cy="0"/>
+        </a:xfrm>
+      </p:grpSpPr>
+      <p:sp>
+        <p:nvSpPr>
+          <p:cNvPr id="2" name="Title 1">
+            <a:extLst>
+              <a:ext uri="{FF2B5EF4-FFF2-40B4-BE49-F238E27FC236}">
+                <a16:creationId xmlns:a16="http://schemas.microsoft.com/office/drawing/2014/main" id="{FE0064C2-168A-4628-A789-D98B0E2A238D}"/>
+              </a:ext>
+            </a:extLst>
+          </p:cNvPr>
+          <p:cNvSpPr>
+            <a:spLocks noGrp="1"/>
+          </p:cNvSpPr>
+          <p:nvPr>
+            <p:ph type="title"/>
+          </p:nvPr>
+        </p:nvSpPr>
+        <p:spPr/>
+        <p:txBody>
+          <a:bodyPr/>
+          <a:lstStyle/>
+          <a:p>
+            <a:r>
+              <a:rPr lang="en-GB" dirty="0"/>
+              <a:t>What could’ve been better </a:t>
+            </a:r>
+          </a:p>
+        </p:txBody>
+      </p:sp>
+      <p:sp>
+        <p:nvSpPr>
+          <p:cNvPr id="3" name="Content Placeholder 2">
+            <a:extLst>
+              <a:ext uri="{FF2B5EF4-FFF2-40B4-BE49-F238E27FC236}">
+                <a16:creationId xmlns:a16="http://schemas.microsoft.com/office/drawing/2014/main" id="{10CAF73D-94B9-43E5-8EEE-73FBDF9ED6CB}"/>
+              </a:ext>
+            </a:extLst>
+          </p:cNvPr>
+          <p:cNvSpPr>
+            <a:spLocks noGrp="1"/>
+          </p:cNvSpPr>
+          <p:nvPr>
+            <p:ph idx="1"/>
+          </p:nvPr>
+        </p:nvSpPr>
+        <p:spPr/>
+        <p:txBody>
+          <a:bodyPr/>
+          <a:lstStyle/>
+          <a:p>
+            <a:endParaRPr lang="en-GB"/>
+          </a:p>
+        </p:txBody>
+      </p:sp>
+    </p:spTree>
+    <p:extLst>
+      <p:ext uri="{BB962C8B-B14F-4D97-AF65-F5344CB8AC3E}">
+        <p14:creationId xmlns:p14="http://schemas.microsoft.com/office/powerpoint/2010/main" val="3389332216"/>
+      </p:ext>
+    </p:extLst>
+  </p:cSld>
+  <p:clrMapOvr>
+    <a:masterClrMapping/>
+  </p:clrMapOvr>
+</p:sld>
+</file>
+
+<file path=ppt/slides/slide17.xml><?xml version="1.0" encoding="utf-8"?>
+<p:sld xmlns:a="http://schemas.openxmlformats.org/drawingml/2006/main" xmlns:r="http://schemas.openxmlformats.org/officeDocument/2006/relationships" xmlns:p="http://schemas.openxmlformats.org/presentationml/2006/main">
+  <p:cSld>
+    <p:spTree>
+      <p:nvGrpSpPr>
+        <p:cNvPr id="1" name=""/>
+        <p:cNvGrpSpPr/>
+        <p:nvPr/>
+      </p:nvGrpSpPr>
+      <p:grpSpPr>
+        <a:xfrm>
+          <a:off x="0" y="0"/>
+          <a:ext cx="0" cy="0"/>
+          <a:chOff x="0" y="0"/>
+          <a:chExt cx="0" cy="0"/>
+        </a:xfrm>
+      </p:grpSpPr>
+      <p:sp>
+        <p:nvSpPr>
+          <p:cNvPr id="2" name="Title 1">
+            <a:extLst>
+              <a:ext uri="{FF2B5EF4-FFF2-40B4-BE49-F238E27FC236}">
+                <a16:creationId xmlns:a16="http://schemas.microsoft.com/office/drawing/2014/main" id="{9A2B80BB-0102-4BA4-AD62-873376724C39}"/>
+              </a:ext>
+            </a:extLst>
+          </p:cNvPr>
+          <p:cNvSpPr>
+            <a:spLocks noGrp="1"/>
+          </p:cNvSpPr>
+          <p:nvPr>
+            <p:ph type="title"/>
+          </p:nvPr>
+        </p:nvSpPr>
+        <p:spPr/>
+        <p:txBody>
+          <a:bodyPr/>
+          <a:lstStyle/>
+          <a:p>
+            <a:r>
+              <a:rPr lang="en-GB" dirty="0"/>
+              <a:t>How we feel</a:t>
+            </a:r>
+          </a:p>
+        </p:txBody>
+      </p:sp>
+      <p:sp>
+        <p:nvSpPr>
+          <p:cNvPr id="3" name="Content Placeholder 2">
+            <a:extLst>
+              <a:ext uri="{FF2B5EF4-FFF2-40B4-BE49-F238E27FC236}">
+                <a16:creationId xmlns:a16="http://schemas.microsoft.com/office/drawing/2014/main" id="{F6E80C0A-882D-47D8-A5E9-E5E292404AA5}"/>
+              </a:ext>
+            </a:extLst>
+          </p:cNvPr>
+          <p:cNvSpPr>
+            <a:spLocks noGrp="1"/>
+          </p:cNvSpPr>
+          <p:nvPr>
+            <p:ph idx="1"/>
+          </p:nvPr>
+        </p:nvSpPr>
+        <p:spPr/>
+        <p:txBody>
+          <a:bodyPr/>
+          <a:lstStyle/>
+          <a:p>
+            <a:endParaRPr lang="en-GB"/>
+          </a:p>
+        </p:txBody>
+      </p:sp>
+    </p:spTree>
+    <p:extLst>
+      <p:ext uri="{BB962C8B-B14F-4D97-AF65-F5344CB8AC3E}">
+        <p14:creationId xmlns:p14="http://schemas.microsoft.com/office/powerpoint/2010/main" val="2652108889"/>
       </p:ext>
     </p:extLst>
   </p:cSld>
@@ -4301,7 +4739,7 @@
           <a:bodyPr/>
           <a:lstStyle/>
           <a:p>
-            <a:endParaRPr lang="en-GB"/>
+            <a:endParaRPr lang="en-GB" dirty="0"/>
           </a:p>
         </p:txBody>
       </p:sp>

</xml_diff>